<commit_message>
Fix bugs in adding table,chart, media and movie poster to .pptx file.
</commit_message>
<xml_diff>
--- a/src/outputs/ChatPPT Demo.pptx
+++ b/src/outputs/ChatPPT Demo.pptx
@@ -5,18 +5,19 @@
     <p:sldMasterId id="2147483696" r:id="rId4"/>
   </p:sldMasterIdLst>
   <p:notesMasterIdLst>
-    <p:notesMasterId r:id="rId5"/>
+    <p:notesMasterId r:id="rId12"/>
   </p:notesMasterIdLst>
   <p:handoutMasterIdLst>
-    <p:handoutMasterId r:id="rId6"/>
+    <p:handoutMasterId r:id="rId13"/>
   </p:handoutMasterIdLst>
   <p:sldIdLst>
-    <p:sldId id="256" r:id="rId11"/>
-    <p:sldId id="257" r:id="rId12"/>
-    <p:sldId id="258" r:id="rId13"/>
-    <p:sldId id="259" r:id="rId14"/>
-    <p:sldId id="260" r:id="rId15"/>
-    <p:sldId id="261" r:id="rId16"/>
+    <p:sldId id="256" r:id="rId5"/>
+    <p:sldId id="257" r:id="rId6"/>
+    <p:sldId id="258" r:id="rId7"/>
+    <p:sldId id="259" r:id="rId8"/>
+    <p:sldId id="260" r:id="rId9"/>
+    <p:sldId id="261" r:id="rId10"/>
+    <p:sldId id="262" r:id="rId11"/>
   </p:sldIdLst>
   <p:sldSz cx="12192000" cy="6858000"/>
   <p:notesSz cx="6858000" cy="9144000"/>
@@ -124,6 +125,225 @@
     </p:ext>
   </p:extLst>
 </p:presentation>
+</file>
+
+<file path=ppt/charts/chart1.xml><?xml version="1.0" encoding="utf-8"?>
+<c:chartSpace xmlns:c="http://schemas.openxmlformats.org/drawingml/2006/chart" xmlns:a="http://schemas.openxmlformats.org/drawingml/2006/main" xmlns:r="http://schemas.openxmlformats.org/officeDocument/2006/relationships" xmlns:c16r2="http://schemas.microsoft.com/office/drawing/2015/06/chart">
+  <c:date1904 val="0"/>
+  <c:lang val="zh-CN"/>
+  <c:roundedCorners val="1"/>
+  <c:style val="2"/>
+  <c:chart>
+    <c:autoTitleDeleted val="0"/>
+    <c:plotArea>
+      <c:layout/>
+      <c:barChart>
+        <c:barDir val="col"/>
+        <c:grouping val="clustered"/>
+        <c:varyColors val="1"/>
+        <c:ser>
+          <c:idx val="0"/>
+          <c:order val="0"/>
+          <c:tx>
+            <c:strRef>
+              <c:f>Sheet1!$B$1</c:f>
+              <c:strCache>
+                <c:ptCount val="1"/>
+                <c:pt idx="0">
+                  <c:v>甲</c:v>
+                </c:pt>
+              </c:strCache>
+            </c:strRef>
+          </c:tx>
+          <c:invertIfNegative val="1"/>
+          <c:cat>
+            <c:numRef>
+              <c:f>Sheet1!$A$2:$A$6</c:f>
+              <c:numCache>
+                <c:formatCode>General</c:formatCode>
+                <c:ptCount val="5"/>
+                <c:pt idx="0">
+                  <c:v>2020</c:v>
+                </c:pt>
+                <c:pt idx="1">
+                  <c:v>2021</c:v>
+                </c:pt>
+                <c:pt idx="2">
+                  <c:v>2022</c:v>
+                </c:pt>
+                <c:pt idx="3">
+                  <c:v>2023</c:v>
+                </c:pt>
+                <c:pt idx="4">
+                  <c:v>2024</c:v>
+                </c:pt>
+              </c:numCache>
+            </c:numRef>
+          </c:cat>
+          <c:val>
+            <c:numRef>
+              <c:f>Sheet1!$B$2:$B$6</c:f>
+              <c:numCache>
+                <c:formatCode>General</c:formatCode>
+                <c:ptCount val="5"/>
+                <c:pt idx="0">
+                  <c:v>2</c:v>
+                </c:pt>
+                <c:pt idx="1">
+                  <c:v>3</c:v>
+                </c:pt>
+                <c:pt idx="2">
+                  <c:v>4</c:v>
+                </c:pt>
+                <c:pt idx="3">
+                  <c:v>5</c:v>
+                </c:pt>
+                <c:pt idx="4">
+                  <c:v>6</c:v>
+                </c:pt>
+              </c:numCache>
+            </c:numRef>
+          </c:val>
+          <c:extLst>
+            <c:ext xmlns:c16="http://schemas.microsoft.com/office/drawing/2014/chart" uri="{C3380CC4-5D6E-409C-BE32-E72D297353CC}">
+              <c16:uniqueId val="{00000000-82F1-4476-8577-5D1DE1C7219F}"/>
+            </c:ext>
+          </c:extLst>
+        </c:ser>
+        <c:ser>
+          <c:idx val="1"/>
+          <c:order val="1"/>
+          <c:tx>
+            <c:strRef>
+              <c:f>Sheet1!$C$1</c:f>
+              <c:strCache>
+                <c:ptCount val="1"/>
+                <c:pt idx="0">
+                  <c:v>乙</c:v>
+                </c:pt>
+              </c:strCache>
+            </c:strRef>
+          </c:tx>
+          <c:invertIfNegative val="1"/>
+          <c:cat>
+            <c:numRef>
+              <c:f>Sheet1!$A$2:$A$6</c:f>
+              <c:numCache>
+                <c:formatCode>General</c:formatCode>
+                <c:ptCount val="5"/>
+                <c:pt idx="0">
+                  <c:v>2020</c:v>
+                </c:pt>
+                <c:pt idx="1">
+                  <c:v>2021</c:v>
+                </c:pt>
+                <c:pt idx="2">
+                  <c:v>2022</c:v>
+                </c:pt>
+                <c:pt idx="3">
+                  <c:v>2023</c:v>
+                </c:pt>
+                <c:pt idx="4">
+                  <c:v>2024</c:v>
+                </c:pt>
+              </c:numCache>
+            </c:numRef>
+          </c:cat>
+          <c:val>
+            <c:numRef>
+              <c:f>Sheet1!$C$2:$C$6</c:f>
+              <c:numCache>
+                <c:formatCode>General</c:formatCode>
+                <c:ptCount val="5"/>
+                <c:pt idx="0">
+                  <c:v>3.5</c:v>
+                </c:pt>
+                <c:pt idx="1">
+                  <c:v>4.5</c:v>
+                </c:pt>
+                <c:pt idx="2">
+                  <c:v>5.5</c:v>
+                </c:pt>
+                <c:pt idx="3">
+                  <c:v>6.5</c:v>
+                </c:pt>
+                <c:pt idx="4">
+                  <c:v>7.5</c:v>
+                </c:pt>
+              </c:numCache>
+            </c:numRef>
+          </c:val>
+          <c:extLst>
+            <c:ext xmlns:c16="http://schemas.microsoft.com/office/drawing/2014/chart" uri="{C3380CC4-5D6E-409C-BE32-E72D297353CC}">
+              <c16:uniqueId val="{00000001-82F1-4476-8577-5D1DE1C7219F}"/>
+            </c:ext>
+          </c:extLst>
+        </c:ser>
+        <c:dLbls>
+          <c:showLegendKey val="0"/>
+          <c:showVal val="0"/>
+          <c:showCatName val="0"/>
+          <c:showSerName val="0"/>
+          <c:showPercent val="0"/>
+          <c:showBubbleSize val="0"/>
+        </c:dLbls>
+        <c:gapWidth val="150"/>
+        <c:axId val="-2068027336"/>
+        <c:axId val="-2113994440"/>
+      </c:barChart>
+      <c:catAx>
+        <c:axId val="-2068027336"/>
+        <c:scaling>
+          <c:orientation val="minMax"/>
+        </c:scaling>
+        <c:delete val="0"/>
+        <c:axPos val="b"/>
+        <c:numFmt formatCode="General" sourceLinked="0"/>
+        <c:majorTickMark val="out"/>
+        <c:minorTickMark val="none"/>
+        <c:tickLblPos val="nextTo"/>
+        <c:crossAx val="-2113994440"/>
+        <c:crosses val="autoZero"/>
+        <c:auto val="1"/>
+        <c:lblAlgn val="ctr"/>
+        <c:lblOffset val="100"/>
+        <c:noMultiLvlLbl val="0"/>
+      </c:catAx>
+      <c:valAx>
+        <c:axId val="-2113994440"/>
+        <c:scaling>
+          <c:orientation val="minMax"/>
+        </c:scaling>
+        <c:delete val="0"/>
+        <c:axPos val="l"/>
+        <c:majorGridlines/>
+        <c:numFmt formatCode="General" sourceLinked="1"/>
+        <c:majorTickMark val="out"/>
+        <c:minorTickMark val="none"/>
+        <c:tickLblPos val="nextTo"/>
+        <c:crossAx val="-2068027336"/>
+        <c:crosses val="autoZero"/>
+        <c:crossBetween val="between"/>
+      </c:valAx>
+    </c:plotArea>
+    <c:plotVisOnly val="1"/>
+    <c:dispBlanksAs val="gap"/>
+    <c:showDLblsOverMax val="1"/>
+  </c:chart>
+  <c:txPr>
+    <a:bodyPr/>
+    <a:lstStyle/>
+    <a:p>
+      <a:pPr>
+        <a:defRPr sz="1800"/>
+      </a:pPr>
+      <a:endParaRPr lang="zh-CN"/>
+    </a:p>
+  </c:txPr>
+  <c:externalData r:id="rId1">
+    <c:autoUpdate val="0"/>
+  </c:externalData>
+</c:chartSpace>
 </file>
 
 <file path=ppt/handoutMasters/handoutMaster1.xml><?xml version="1.0" encoding="utf-8"?>
@@ -10481,7 +10701,7 @@
 </file>
 
 <file path=ppt/slides/slide1.xml><?xml version="1.0" encoding="utf-8"?>
-<p:sld xmlns:a="http://schemas.openxmlformats.org/drawingml/2006/main" xmlns:p="http://schemas.openxmlformats.org/presentationml/2006/main" xmlns:r="http://schemas.openxmlformats.org/officeDocument/2006/relationships">
+<p:sld xmlns:a="http://schemas.openxmlformats.org/drawingml/2006/main" xmlns:r="http://schemas.openxmlformats.org/officeDocument/2006/relationships" xmlns:p="http://schemas.openxmlformats.org/presentationml/2006/main">
   <p:cSld>
     <p:spTree>
       <p:nvGrpSpPr>
@@ -10489,7 +10709,14 @@
         <p:cNvGrpSpPr/>
         <p:nvPr/>
       </p:nvGrpSpPr>
-      <p:grpSpPr/>
+      <p:grpSpPr>
+        <a:xfrm>
+          <a:off x="0" y="0"/>
+          <a:ext cx="0" cy="0"/>
+          <a:chOff x="0" y="0"/>
+          <a:chExt cx="0" cy="0"/>
+        </a:xfrm>
+      </p:grpSpPr>
       <p:sp>
         <p:nvSpPr>
           <p:cNvPr id="2" name="Title 1"/>
@@ -10520,7 +10747,7 @@
 </file>
 
 <file path=ppt/slides/slide2.xml><?xml version="1.0" encoding="utf-8"?>
-<p:sld xmlns:a="http://schemas.openxmlformats.org/drawingml/2006/main" xmlns:p="http://schemas.openxmlformats.org/presentationml/2006/main" xmlns:r="http://schemas.openxmlformats.org/officeDocument/2006/relationships">
+<p:sld xmlns:a="http://schemas.openxmlformats.org/drawingml/2006/main" xmlns:r="http://schemas.openxmlformats.org/officeDocument/2006/relationships" xmlns:p="http://schemas.openxmlformats.org/presentationml/2006/main">
   <p:cSld>
     <p:spTree>
       <p:nvGrpSpPr>
@@ -10528,7 +10755,14 @@
         <p:cNvGrpSpPr/>
         <p:nvPr/>
       </p:nvGrpSpPr>
-      <p:grpSpPr/>
+      <p:grpSpPr>
+        <a:xfrm>
+          <a:off x="0" y="0"/>
+          <a:ext cx="0" cy="0"/>
+          <a:chOff x="0" y="0"/>
+          <a:chExt cx="0" cy="0"/>
+        </a:xfrm>
+      </p:grpSpPr>
       <p:sp>
         <p:nvSpPr>
           <p:cNvPr id="2" name="Title 1"/>
@@ -10557,22 +10791,22 @@
             <a:spLocks noGrp="1"/>
           </p:cNvSpPr>
           <p:nvPr>
-            <p:ph idx="13" sz="quarter"/>
+            <p:ph sz="quarter" idx="13"/>
           </p:nvPr>
         </p:nvSpPr>
         <p:spPr/>
         <p:txBody>
           <a:bodyPr/>
           <a:lstStyle/>
-          <a:p/>
-          <a:p>
-            <a:pPr/>
+          <a:p>
+            <a:endParaRPr/>
+          </a:p>
+          <a:p>
             <a:r>
               <a:t>总收入增长15%</a:t>
             </a:r>
           </a:p>
           <a:p>
-            <a:pPr/>
             <a:r>
               <a:t>市场份额扩大至30%</a:t>
             </a:r>
@@ -10588,7 +10822,7 @@
 </file>
 
 <file path=ppt/slides/slide3.xml><?xml version="1.0" encoding="utf-8"?>
-<p:sld xmlns:a="http://schemas.openxmlformats.org/drawingml/2006/main" xmlns:p="http://schemas.openxmlformats.org/presentationml/2006/main" xmlns:r="http://schemas.openxmlformats.org/officeDocument/2006/relationships">
+<p:sld xmlns:a="http://schemas.openxmlformats.org/drawingml/2006/main" xmlns:r="http://schemas.openxmlformats.org/officeDocument/2006/relationships" xmlns:p="http://schemas.openxmlformats.org/presentationml/2006/main">
   <p:cSld>
     <p:spTree>
       <p:nvGrpSpPr>
@@ -10596,7 +10830,14 @@
         <p:cNvGrpSpPr/>
         <p:nvPr/>
       </p:nvGrpSpPr>
-      <p:grpSpPr/>
+      <p:grpSpPr>
+        <a:xfrm>
+          <a:off x="0" y="0"/>
+          <a:ext cx="0" cy="0"/>
+          <a:chOff x="0" y="0"/>
+          <a:chExt cx="0" cy="0"/>
+        </a:xfrm>
+      </p:grpSpPr>
       <p:sp>
         <p:nvSpPr>
           <p:cNvPr id="2" name="Title 1"/>
@@ -10625,16 +10866,17 @@
             <a:spLocks noGrp="1"/>
           </p:cNvSpPr>
           <p:nvPr>
-            <p:ph idx="2" sz="half"/>
+            <p:ph sz="half" idx="2"/>
           </p:nvPr>
         </p:nvSpPr>
         <p:spPr/>
         <p:txBody>
           <a:bodyPr/>
           <a:lstStyle/>
-          <a:p/>
-          <a:p>
-            <a:pPr/>
+          <a:p>
+            <a:endParaRPr/>
+          </a:p>
+          <a:p>
             <a:r>
               <a:t>OpenAI 利润不断增加</a:t>
             </a:r>
@@ -10648,7 +10890,7 @@
             <a:picLocks noGrp="1" noChangeAspect="1"/>
           </p:cNvPicPr>
           <p:nvPr>
-            <p:ph type="pic" idx="14" sz="quarter"/>
+            <p:ph type="pic" sz="quarter" idx="14"/>
           </p:nvPr>
         </p:nvPicPr>
         <p:blipFill>
@@ -10669,7 +10911,7 @@
 </file>
 
 <file path=ppt/slides/slide4.xml><?xml version="1.0" encoding="utf-8"?>
-<p:sld xmlns:a="http://schemas.openxmlformats.org/drawingml/2006/main" xmlns:p="http://schemas.openxmlformats.org/presentationml/2006/main" xmlns:r="http://schemas.openxmlformats.org/officeDocument/2006/relationships">
+<p:sld xmlns:a="http://schemas.openxmlformats.org/drawingml/2006/main" xmlns:r="http://schemas.openxmlformats.org/officeDocument/2006/relationships" xmlns:p="http://schemas.openxmlformats.org/presentationml/2006/main">
   <p:cSld>
     <p:spTree>
       <p:nvGrpSpPr>
@@ -10677,7 +10919,14 @@
         <p:cNvGrpSpPr/>
         <p:nvPr/>
       </p:nvGrpSpPr>
-      <p:grpSpPr/>
+      <p:grpSpPr>
+        <a:xfrm>
+          <a:off x="0" y="0"/>
+          <a:ext cx="0" cy="0"/>
+          <a:chOff x="0" y="0"/>
+          <a:chExt cx="0" cy="0"/>
+        </a:xfrm>
+      </p:grpSpPr>
       <p:sp>
         <p:nvSpPr>
           <p:cNvPr id="2" name="Title 1"/>
@@ -10706,22 +10955,22 @@
             <a:spLocks noGrp="1"/>
           </p:cNvSpPr>
           <p:nvPr>
-            <p:ph idx="2" sz="half"/>
+            <p:ph sz="half" idx="2"/>
           </p:nvPr>
         </p:nvSpPr>
         <p:spPr/>
         <p:txBody>
           <a:bodyPr/>
           <a:lstStyle/>
-          <a:p/>
-          <a:p>
-            <a:pPr/>
+          <a:p>
+            <a:endParaRPr/>
+          </a:p>
+          <a:p>
             <a:r>
               <a:t>产品A: 特色功能介绍</a:t>
             </a:r>
           </a:p>
           <a:p>
-            <a:pPr/>
             <a:r>
               <a:t>产品B: 市场定位</a:t>
             </a:r>
@@ -10735,7 +10984,7 @@
             <a:picLocks noGrp="1" noChangeAspect="1"/>
           </p:cNvPicPr>
           <p:nvPr>
-            <p:ph type="pic" idx="14" sz="quarter"/>
+            <p:ph type="pic" sz="quarter" idx="14"/>
           </p:nvPr>
         </p:nvPicPr>
         <p:blipFill>
@@ -10756,7 +11005,7 @@
 </file>
 
 <file path=ppt/slides/slide5.xml><?xml version="1.0" encoding="utf-8"?>
-<p:sld xmlns:a="http://schemas.openxmlformats.org/drawingml/2006/main" xmlns:p="http://schemas.openxmlformats.org/presentationml/2006/main" xmlns:r="http://schemas.openxmlformats.org/officeDocument/2006/relationships">
+<p:sld xmlns:a="http://schemas.openxmlformats.org/drawingml/2006/main" xmlns:r="http://schemas.openxmlformats.org/officeDocument/2006/relationships" xmlns:p="http://schemas.openxmlformats.org/presentationml/2006/main">
   <p:cSld>
     <p:spTree>
       <p:nvGrpSpPr>
@@ -10764,7 +11013,14 @@
         <p:cNvGrpSpPr/>
         <p:nvPr/>
       </p:nvGrpSpPr>
-      <p:grpSpPr/>
+      <p:grpSpPr>
+        <a:xfrm>
+          <a:off x="0" y="0"/>
+          <a:ext cx="0" cy="0"/>
+          <a:chOff x="0" y="0"/>
+          <a:chExt cx="0" cy="0"/>
+        </a:xfrm>
+      </p:grpSpPr>
       <p:sp>
         <p:nvSpPr>
           <p:cNvPr id="2" name="Title 1"/>
@@ -10793,16 +11049,17 @@
             <a:spLocks noGrp="1"/>
           </p:cNvSpPr>
           <p:nvPr>
-            <p:ph idx="2" sz="half"/>
+            <p:ph sz="half" idx="2"/>
           </p:nvPr>
         </p:nvSpPr>
         <p:spPr/>
         <p:txBody>
           <a:bodyPr/>
           <a:lstStyle/>
-          <a:p/>
-          <a:p>
-            <a:pPr/>
+          <a:p>
+            <a:endParaRPr/>
+          </a:p>
+          <a:p>
             <a:r>
               <a:t>市场份额占比逐步提升</a:t>
             </a:r>
@@ -10816,7 +11073,7 @@
             <a:graphicFrameLocks noGrp="1"/>
           </p:cNvGraphicFramePr>
           <p:nvPr>
-            <p:ph type="tbl" idx="13" sz="quarter"/>
+            <p:ph type="tbl" sz="quarter" idx="13"/>
           </p:nvPr>
         </p:nvGraphicFramePr>
         <p:xfrm>
@@ -10830,12 +11087,48 @@
                 <a:tableStyleId>{5C22544A-7EE6-4342-B048-85BDC9FD1C3A}</a:tableStyleId>
               </a:tblPr>
               <a:tblGrid>
-                <a:gridCol w="1107324"/>
-                <a:gridCol w="1107324"/>
-                <a:gridCol w="1107324"/>
-                <a:gridCol w="1107324"/>
-                <a:gridCol w="1107324"/>
-                <a:gridCol w="1107324"/>
+                <a:gridCol w="1107324">
+                  <a:extLst>
+                    <a:ext uri="{9D8B030D-6E8A-4147-A177-3AD203B41FA5}">
+                      <a16:colId xmlns:a16="http://schemas.microsoft.com/office/drawing/2014/main" val="20000"/>
+                    </a:ext>
+                  </a:extLst>
+                </a:gridCol>
+                <a:gridCol w="1107324">
+                  <a:extLst>
+                    <a:ext uri="{9D8B030D-6E8A-4147-A177-3AD203B41FA5}">
+                      <a16:colId xmlns:a16="http://schemas.microsoft.com/office/drawing/2014/main" val="20001"/>
+                    </a:ext>
+                  </a:extLst>
+                </a:gridCol>
+                <a:gridCol w="1107324">
+                  <a:extLst>
+                    <a:ext uri="{9D8B030D-6E8A-4147-A177-3AD203B41FA5}">
+                      <a16:colId xmlns:a16="http://schemas.microsoft.com/office/drawing/2014/main" val="20002"/>
+                    </a:ext>
+                  </a:extLst>
+                </a:gridCol>
+                <a:gridCol w="1107324">
+                  <a:extLst>
+                    <a:ext uri="{9D8B030D-6E8A-4147-A177-3AD203B41FA5}">
+                      <a16:colId xmlns:a16="http://schemas.microsoft.com/office/drawing/2014/main" val="20003"/>
+                    </a:ext>
+                  </a:extLst>
+                </a:gridCol>
+                <a:gridCol w="1107324">
+                  <a:extLst>
+                    <a:ext uri="{9D8B030D-6E8A-4147-A177-3AD203B41FA5}">
+                      <a16:colId xmlns:a16="http://schemas.microsoft.com/office/drawing/2014/main" val="20004"/>
+                    </a:ext>
+                  </a:extLst>
+                </a:gridCol>
+                <a:gridCol w="1107324">
+                  <a:extLst>
+                    <a:ext uri="{9D8B030D-6E8A-4147-A177-3AD203B41FA5}">
+                      <a16:colId xmlns:a16="http://schemas.microsoft.com/office/drawing/2014/main" val="20005"/>
+                    </a:ext>
+                  </a:extLst>
+                </a:gridCol>
               </a:tblGrid>
               <a:tr h="370840">
                 <a:tc>
@@ -10910,6 +11203,11 @@
                   </a:txBody>
                   <a:tcPr/>
                 </a:tc>
+                <a:extLst>
+                  <a:ext uri="{0D108BD9-81ED-4DB2-BD59-A6C34878D82A}">
+                    <a16:rowId xmlns:a16="http://schemas.microsoft.com/office/drawing/2014/main" val="10000"/>
+                  </a:ext>
+                </a:extLst>
               </a:tr>
               <a:tr h="370840">
                 <a:tc>
@@ -10984,6 +11282,11 @@
                   </a:txBody>
                   <a:tcPr/>
                 </a:tc>
+                <a:extLst>
+                  <a:ext uri="{0D108BD9-81ED-4DB2-BD59-A6C34878D82A}">
+                    <a16:rowId xmlns:a16="http://schemas.microsoft.com/office/drawing/2014/main" val="10001"/>
+                  </a:ext>
+                </a:extLst>
               </a:tr>
               <a:tr h="370840">
                 <a:tc>
@@ -11058,6 +11361,11 @@
                   </a:txBody>
                   <a:tcPr/>
                 </a:tc>
+                <a:extLst>
+                  <a:ext uri="{0D108BD9-81ED-4DB2-BD59-A6C34878D82A}">
+                    <a16:rowId xmlns:a16="http://schemas.microsoft.com/office/drawing/2014/main" val="10002"/>
+                  </a:ext>
+                </a:extLst>
               </a:tr>
             </a:tbl>
           </a:graphicData>
@@ -11072,7 +11380,7 @@
 </file>
 
 <file path=ppt/slides/slide6.xml><?xml version="1.0" encoding="utf-8"?>
-<p:sld xmlns:a="http://schemas.openxmlformats.org/drawingml/2006/main" xmlns:p="http://schemas.openxmlformats.org/presentationml/2006/main" xmlns:r="http://schemas.openxmlformats.org/officeDocument/2006/relationships">
+<p:sld xmlns:a="http://schemas.openxmlformats.org/drawingml/2006/main" xmlns:r="http://schemas.openxmlformats.org/officeDocument/2006/relationships" xmlns:p="http://schemas.openxmlformats.org/presentationml/2006/main">
   <p:cSld>
     <p:spTree>
       <p:nvGrpSpPr>
@@ -11080,7 +11388,14 @@
         <p:cNvGrpSpPr/>
         <p:nvPr/>
       </p:nvGrpSpPr>
-      <p:grpSpPr/>
+      <p:grpSpPr>
+        <a:xfrm>
+          <a:off x="0" y="0"/>
+          <a:ext cx="0" cy="0"/>
+          <a:chOff x="0" y="0"/>
+          <a:chExt cx="0" cy="0"/>
+        </a:xfrm>
+      </p:grpSpPr>
       <p:sp>
         <p:nvSpPr>
           <p:cNvPr id="2" name="Title 1"/>
@@ -11097,7 +11412,7 @@
           <a:lstStyle/>
           <a:p>
             <a:r>
-              <a:t>结语</a:t>
+              <a:t>行业趋势</a:t>
             </a:r>
           </a:p>
         </p:txBody>
@@ -11109,22 +11424,112 @@
             <a:spLocks noGrp="1"/>
           </p:cNvSpPr>
           <p:nvPr>
-            <p:ph idx="2" sz="half"/>
+            <p:ph sz="half" idx="2"/>
           </p:nvPr>
         </p:nvSpPr>
         <p:spPr/>
         <p:txBody>
           <a:bodyPr/>
           <a:lstStyle/>
-          <a:p/>
-          <a:p>
-            <a:pPr/>
+          <a:p>
+            <a:endParaRPr/>
+          </a:p>
+          <a:p>
+            <a:r>
+              <a:t>人工智能领域崛起</a:t>
+            </a:r>
+          </a:p>
+        </p:txBody>
+      </p:sp>
+      <p:graphicFrame>
+        <p:nvGraphicFramePr>
+          <p:cNvPr id="4" name="Chart Placeholder 3"/>
+          <p:cNvGraphicFramePr>
+            <a:graphicFrameLocks noGrp="1"/>
+          </p:cNvGraphicFramePr>
+          <p:nvPr>
+            <p:ph type="chart" sz="quarter" idx="14"/>
+          </p:nvPr>
+        </p:nvGraphicFramePr>
+        <p:xfrm>
+          <a:off x="4851400" y="2495074"/>
+          <a:ext cx="6643944" cy="3776186"/>
+        </p:xfrm>
+        <a:graphic>
+          <a:graphicData uri="http://schemas.openxmlformats.org/drawingml/2006/chart">
+            <c:chart xmlns:c="http://schemas.openxmlformats.org/drawingml/2006/chart" xmlns:r="http://schemas.openxmlformats.org/officeDocument/2006/relationships" r:id="rId2"/>
+          </a:graphicData>
+        </a:graphic>
+      </p:graphicFrame>
+    </p:spTree>
+  </p:cSld>
+  <p:clrMapOvr>
+    <a:masterClrMapping/>
+  </p:clrMapOvr>
+</p:sld>
+</file>
+
+<file path=ppt/slides/slide7.xml><?xml version="1.0" encoding="utf-8"?>
+<p:sld xmlns:a="http://schemas.openxmlformats.org/drawingml/2006/main" xmlns:r="http://schemas.openxmlformats.org/officeDocument/2006/relationships" xmlns:p="http://schemas.openxmlformats.org/presentationml/2006/main">
+  <p:cSld>
+    <p:spTree>
+      <p:nvGrpSpPr>
+        <p:cNvPr id="1" name=""/>
+        <p:cNvGrpSpPr/>
+        <p:nvPr/>
+      </p:nvGrpSpPr>
+      <p:grpSpPr>
+        <a:xfrm>
+          <a:off x="0" y="0"/>
+          <a:ext cx="0" cy="0"/>
+          <a:chOff x="0" y="0"/>
+          <a:chExt cx="0" cy="0"/>
+        </a:xfrm>
+      </p:grpSpPr>
+      <p:sp>
+        <p:nvSpPr>
+          <p:cNvPr id="2" name="Title 1"/>
+          <p:cNvSpPr>
+            <a:spLocks noGrp="1"/>
+          </p:cNvSpPr>
+          <p:nvPr>
+            <p:ph type="title"/>
+          </p:nvPr>
+        </p:nvSpPr>
+        <p:spPr/>
+        <p:txBody>
+          <a:bodyPr/>
+          <a:lstStyle/>
+          <a:p>
+            <a:r>
+              <a:t>结语</a:t>
+            </a:r>
+          </a:p>
+        </p:txBody>
+      </p:sp>
+      <p:sp>
+        <p:nvSpPr>
+          <p:cNvPr id="3" name="Content Placeholder 2"/>
+          <p:cNvSpPr>
+            <a:spLocks noGrp="1"/>
+          </p:cNvSpPr>
+          <p:nvPr>
+            <p:ph sz="half" idx="2"/>
+          </p:nvPr>
+        </p:nvSpPr>
+        <p:spPr/>
+        <p:txBody>
+          <a:bodyPr/>
+          <a:lstStyle/>
+          <a:p>
+            <a:endParaRPr/>
+          </a:p>
+          <a:p>
             <a:r>
               <a:t>总结经营业绩</a:t>
             </a:r>
           </a:p>
           <a:p>
-            <a:pPr/>
             <a:r>
               <a:t>展望未来发展</a:t>
             </a:r>
@@ -11138,7 +11543,7 @@
             <a:spLocks noGrp="1"/>
           </p:cNvSpPr>
           <p:nvPr>
-            <p:ph type="media" idx="15" sz="quarter"/>
+            <p:ph type="media" sz="quarter" idx="15"/>
           </p:nvPr>
         </p:nvSpPr>
         <p:spPr/>
@@ -11152,10 +11557,10 @@
             <a:picLocks noChangeAspect="1"/>
           </p:cNvPicPr>
           <p:nvPr>
-            <a:videoFile r:link="rId3"/>
+            <a:videoFile r:link="rId2"/>
             <p:extLst>
               <p:ext uri="{DAA4B4D4-6D71-4841-9C94-3DE7FCFB9230}">
-                <p14:media xmlns:p14="http://schemas.microsoft.com/office/powerpoint/2010/main" r:embed="rId2"/>
+                <p14:media xmlns:p14="http://schemas.microsoft.com/office/powerpoint/2010/main" r:embed="rId1"/>
               </p:ext>
             </p:extLst>
           </p:nvPr>
@@ -12077,12 +12482,23 @@
 </file>
 
 <file path=customXml/item1.xml><?xml version="1.0" encoding="utf-8"?>
-<?mso-contentType ?>
-<FormTemplates xmlns="http://schemas.microsoft.com/sharepoint/v3/contenttype/forms">
-  <Display>DocumentLibraryForm</Display>
-  <Edit>DocumentLibraryForm</Edit>
-  <New>DocumentLibraryForm</New>
-</FormTemplates>
+<p:properties xmlns:p="http://schemas.microsoft.com/office/2006/metadata/properties" xmlns:xsi="http://www.w3.org/2001/XMLSchema-instance" xmlns:pc="http://schemas.microsoft.com/office/infopath/2007/PartnerControls">
+  <documentManagement>
+    <_ip_UnifiedCompliancePolicyUIAction xmlns="http://schemas.microsoft.com/sharepoint/v3" xsi:nil="true"/>
+    <Image xmlns="71af3243-3dd4-4a8d-8c0d-dd76da1f02a5">
+      <Url xsi:nil="true"/>
+      <Description xsi:nil="true"/>
+    </Image>
+    <Status xmlns="71af3243-3dd4-4a8d-8c0d-dd76da1f02a5">Not started</Status>
+    <Background xmlns="71af3243-3dd4-4a8d-8c0d-dd76da1f02a5">false</Background>
+    <_ip_UnifiedCompliancePolicyProperties xmlns="http://schemas.microsoft.com/sharepoint/v3" xsi:nil="true"/>
+    <ImageTagsTaxHTField xmlns="71af3243-3dd4-4a8d-8c0d-dd76da1f02a5">
+      <Terms xmlns="http://schemas.microsoft.com/office/infopath/2007/PartnerControls"/>
+    </ImageTagsTaxHTField>
+    <TaxCatchAll xmlns="230e9df3-be65-4c73-a93b-d1236ebd677e" xsi:nil="true"/>
+    <MediaServiceKeyPoints xmlns="71af3243-3dd4-4a8d-8c0d-dd76da1f02a5" xsi:nil="true"/>
+  </documentManagement>
+</p:properties>
 </file>
 
 <file path=customXml/item2.xml><?xml version="1.0" encoding="utf-8"?>
@@ -12398,29 +12814,22 @@
 </file>
 
 <file path=customXml/item3.xml><?xml version="1.0" encoding="utf-8"?>
-<p:properties xmlns:p="http://schemas.microsoft.com/office/2006/metadata/properties" xmlns:xsi="http://www.w3.org/2001/XMLSchema-instance" xmlns:pc="http://schemas.microsoft.com/office/infopath/2007/PartnerControls">
-  <documentManagement>
-    <_ip_UnifiedCompliancePolicyUIAction xmlns="http://schemas.microsoft.com/sharepoint/v3" xsi:nil="true"/>
-    <Image xmlns="71af3243-3dd4-4a8d-8c0d-dd76da1f02a5">
-      <Url xsi:nil="true"/>
-      <Description xsi:nil="true"/>
-    </Image>
-    <Status xmlns="71af3243-3dd4-4a8d-8c0d-dd76da1f02a5">Not started</Status>
-    <Background xmlns="71af3243-3dd4-4a8d-8c0d-dd76da1f02a5">false</Background>
-    <_ip_UnifiedCompliancePolicyProperties xmlns="http://schemas.microsoft.com/sharepoint/v3" xsi:nil="true"/>
-    <ImageTagsTaxHTField xmlns="71af3243-3dd4-4a8d-8c0d-dd76da1f02a5">
-      <Terms xmlns="http://schemas.microsoft.com/office/infopath/2007/PartnerControls"/>
-    </ImageTagsTaxHTField>
-    <TaxCatchAll xmlns="230e9df3-be65-4c73-a93b-d1236ebd677e" xsi:nil="true"/>
-    <MediaServiceKeyPoints xmlns="71af3243-3dd4-4a8d-8c0d-dd76da1f02a5" xsi:nil="true"/>
-  </documentManagement>
-</p:properties>
+<?mso-contentType ?>
+<FormTemplates xmlns="http://schemas.microsoft.com/sharepoint/v3/contenttype/forms">
+  <Display>DocumentLibraryForm</Display>
+  <Edit>DocumentLibraryForm</Edit>
+  <New>DocumentLibraryForm</New>
+</FormTemplates>
 </file>
 
 <file path=customXml/itemProps1.xml><?xml version="1.0" encoding="utf-8"?>
-<ds:datastoreItem xmlns:ds="http://schemas.openxmlformats.org/officeDocument/2006/customXml" ds:itemID="{F5C14155-A57F-48FA-B253-A79CB6269DDC}">
+<ds:datastoreItem xmlns:ds="http://schemas.openxmlformats.org/officeDocument/2006/customXml" ds:itemID="{89316C43-4A17-4971-BB8F-F0F6B8CDF2E0}">
   <ds:schemaRefs>
-    <ds:schemaRef ds:uri="http://schemas.microsoft.com/sharepoint/v3/contenttype/forms"/>
+    <ds:schemaRef ds:uri="http://schemas.microsoft.com/office/2006/metadata/properties"/>
+    <ds:schemaRef ds:uri="http://schemas.microsoft.com/office/infopath/2007/PartnerControls"/>
+    <ds:schemaRef ds:uri="http://schemas.microsoft.com/sharepoint/v3"/>
+    <ds:schemaRef ds:uri="71af3243-3dd4-4a8d-8c0d-dd76da1f02a5"/>
+    <ds:schemaRef ds:uri="230e9df3-be65-4c73-a93b-d1236ebd677e"/>
   </ds:schemaRefs>
 </ds:datastoreItem>
 </file>
@@ -12447,13 +12856,9 @@
 </file>
 
 <file path=customXml/itemProps3.xml><?xml version="1.0" encoding="utf-8"?>
-<ds:datastoreItem xmlns:ds="http://schemas.openxmlformats.org/officeDocument/2006/customXml" ds:itemID="{89316C43-4A17-4971-BB8F-F0F6B8CDF2E0}">
+<ds:datastoreItem xmlns:ds="http://schemas.openxmlformats.org/officeDocument/2006/customXml" ds:itemID="{F5C14155-A57F-48FA-B253-A79CB6269DDC}">
   <ds:schemaRefs>
-    <ds:schemaRef ds:uri="http://schemas.microsoft.com/office/2006/metadata/properties"/>
-    <ds:schemaRef ds:uri="http://schemas.microsoft.com/office/infopath/2007/PartnerControls"/>
-    <ds:schemaRef ds:uri="http://schemas.microsoft.com/sharepoint/v3"/>
-    <ds:schemaRef ds:uri="71af3243-3dd4-4a8d-8c0d-dd76da1f02a5"/>
-    <ds:schemaRef ds:uri="230e9df3-be65-4c73-a93b-d1236ebd677e"/>
+    <ds:schemaRef ds:uri="http://schemas.microsoft.com/sharepoint/v3/contenttype/forms"/>
   </ds:schemaRefs>
 </ds:datastoreItem>
 </file>

</xml_diff>